<commit_message>
Simplifications and improvements to TV Broadcasting training slides
</commit_message>
<xml_diff>
--- a/tv-broadcasting/TV broadcasting presentation outline.pptx
+++ b/tv-broadcasting/TV broadcasting presentation outline.pptx
@@ -8,14 +8,16 @@
     <p:sldId id="256" r:id="rId2"/>
     <p:sldId id="257" r:id="rId3"/>
     <p:sldId id="258" r:id="rId4"/>
-    <p:sldId id="265" r:id="rId5"/>
-    <p:sldId id="259" r:id="rId6"/>
-    <p:sldId id="264" r:id="rId7"/>
-    <p:sldId id="267" r:id="rId8"/>
-    <p:sldId id="262" r:id="rId9"/>
-    <p:sldId id="263" r:id="rId10"/>
-    <p:sldId id="266" r:id="rId11"/>
-    <p:sldId id="268" r:id="rId12"/>
+    <p:sldId id="269" r:id="rId5"/>
+    <p:sldId id="265" r:id="rId6"/>
+    <p:sldId id="259" r:id="rId7"/>
+    <p:sldId id="264" r:id="rId8"/>
+    <p:sldId id="270" r:id="rId9"/>
+    <p:sldId id="262" r:id="rId10"/>
+    <p:sldId id="271" r:id="rId11"/>
+    <p:sldId id="266" r:id="rId12"/>
+    <p:sldId id="263" r:id="rId13"/>
+    <p:sldId id="268" r:id="rId14"/>
   </p:sldIdLst>
   <p:sldSz cx="9144000" cy="6858000" type="screen4x3"/>
   <p:notesSz cx="6858000" cy="9144000"/>
@@ -3193,6 +3195,88 @@
           <a:lstStyle/>
           <a:p>
             <a:r>
+              <a:rPr lang="en-US" dirty="0" smtClean="0"/>
+              <a:t>Digital migration</a:t>
+            </a:r>
+            <a:endParaRPr lang="en-US" dirty="0"/>
+          </a:p>
+        </p:txBody>
+      </p:sp>
+      <p:sp>
+        <p:nvSpPr>
+          <p:cNvPr id="3" name="Content Placeholder 2"/>
+          <p:cNvSpPr>
+            <a:spLocks noGrp="1"/>
+          </p:cNvSpPr>
+          <p:nvPr>
+            <p:ph idx="1"/>
+          </p:nvPr>
+        </p:nvSpPr>
+        <p:spPr/>
+        <p:txBody>
+          <a:bodyPr/>
+          <a:lstStyle/>
+          <a:p>
+            <a:r>
+              <a:rPr lang="en-US" dirty="0"/>
+              <a:t>Terrestrial TV uses old “analogue” standard.</a:t>
+            </a:r>
+          </a:p>
+          <a:p>
+            <a:r>
+              <a:rPr lang="en-US" dirty="0"/>
+              <a:t>Migration: switch to better “digital” standard, and turn analogue off.</a:t>
+            </a:r>
+            <a:endParaRPr lang="en-US" dirty="0"/>
+          </a:p>
+        </p:txBody>
+      </p:sp>
+    </p:spTree>
+    <p:extLst>
+      <p:ext uri="{BB962C8B-B14F-4D97-AF65-F5344CB8AC3E}">
+        <p14:creationId xmlns:p14="http://schemas.microsoft.com/office/powerpoint/2010/main" val="2176484184"/>
+      </p:ext>
+    </p:extLst>
+  </p:cSld>
+  <p:clrMapOvr>
+    <a:masterClrMapping/>
+  </p:clrMapOvr>
+</p:sld>
+</file>
+
+<file path=ppt/slides/slide11.xml><?xml version="1.0" encoding="utf-8"?>
+<p:sld xmlns:a="http://schemas.openxmlformats.org/drawingml/2006/main" xmlns:r="http://schemas.openxmlformats.org/officeDocument/2006/relationships" xmlns:p="http://schemas.openxmlformats.org/presentationml/2006/main">
+  <p:cSld>
+    <p:spTree>
+      <p:nvGrpSpPr>
+        <p:cNvPr id="1" name=""/>
+        <p:cNvGrpSpPr/>
+        <p:nvPr/>
+      </p:nvGrpSpPr>
+      <p:grpSpPr>
+        <a:xfrm>
+          <a:off x="0" y="0"/>
+          <a:ext cx="0" cy="0"/>
+          <a:chOff x="0" y="0"/>
+          <a:chExt cx="0" cy="0"/>
+        </a:xfrm>
+      </p:grpSpPr>
+      <p:sp>
+        <p:nvSpPr>
+          <p:cNvPr id="2" name="Title 1"/>
+          <p:cNvSpPr>
+            <a:spLocks noGrp="1"/>
+          </p:cNvSpPr>
+          <p:nvPr>
+            <p:ph type="title"/>
+          </p:nvPr>
+        </p:nvSpPr>
+        <p:spPr/>
+        <p:txBody>
+          <a:bodyPr/>
+          <a:lstStyle/>
+          <a:p>
+            <a:r>
               <a:rPr lang="en-US" dirty="0" err="1" smtClean="0"/>
               <a:t>Fluit</a:t>
             </a:r>
@@ -3264,7 +3348,180 @@
 </p:sld>
 </file>
 
-<file path=ppt/slides/slide11.xml><?xml version="1.0" encoding="utf-8"?>
+<file path=ppt/slides/slide12.xml><?xml version="1.0" encoding="utf-8"?>
+<p:sld xmlns:a="http://schemas.openxmlformats.org/drawingml/2006/main" xmlns:r="http://schemas.openxmlformats.org/officeDocument/2006/relationships" xmlns:p="http://schemas.openxmlformats.org/presentationml/2006/main">
+  <p:cSld>
+    <p:spTree>
+      <p:nvGrpSpPr>
+        <p:cNvPr id="1" name=""/>
+        <p:cNvGrpSpPr/>
+        <p:nvPr/>
+      </p:nvGrpSpPr>
+      <p:grpSpPr>
+        <a:xfrm>
+          <a:off x="0" y="0"/>
+          <a:ext cx="0" cy="0"/>
+          <a:chOff x="0" y="0"/>
+          <a:chExt cx="0" cy="0"/>
+        </a:xfrm>
+      </p:grpSpPr>
+      <p:sp>
+        <p:nvSpPr>
+          <p:cNvPr id="2" name="Title 1"/>
+          <p:cNvSpPr>
+            <a:spLocks noGrp="1"/>
+          </p:cNvSpPr>
+          <p:nvPr>
+            <p:ph type="title"/>
+          </p:nvPr>
+        </p:nvSpPr>
+        <p:spPr/>
+        <p:txBody>
+          <a:bodyPr/>
+          <a:lstStyle/>
+          <a:p>
+            <a:r>
+              <a:rPr lang="en-US" dirty="0" smtClean="0"/>
+              <a:t>Digital migration</a:t>
+            </a:r>
+            <a:endParaRPr lang="en-US" dirty="0"/>
+          </a:p>
+        </p:txBody>
+      </p:sp>
+      <p:sp>
+        <p:nvSpPr>
+          <p:cNvPr id="3" name="Content Placeholder 2"/>
+          <p:cNvSpPr>
+            <a:spLocks noGrp="1"/>
+          </p:cNvSpPr>
+          <p:nvPr>
+            <p:ph idx="1"/>
+          </p:nvPr>
+        </p:nvSpPr>
+        <p:spPr/>
+        <p:txBody>
+          <a:bodyPr>
+            <a:normAutofit fontScale="62500" lnSpcReduction="20000"/>
+          </a:bodyPr>
+          <a:lstStyle/>
+          <a:p>
+            <a:r>
+              <a:rPr lang="en-US" dirty="0" smtClean="0"/>
+              <a:t>Terrestrial TV uses old “analogue standard”.</a:t>
+            </a:r>
+          </a:p>
+          <a:p>
+            <a:r>
+              <a:rPr lang="en-US" dirty="0" smtClean="0"/>
+              <a:t>Want to switch to better “digital” standard, and turn analogue off.</a:t>
+            </a:r>
+          </a:p>
+          <a:p>
+            <a:r>
+              <a:rPr lang="en-US" dirty="0" smtClean="0"/>
+              <a:t>However, TVs in SA all currently can only receive the analogue signal — integrated/embedded tuners. Think of it like a built-in decoder. So now what?</a:t>
+            </a:r>
+          </a:p>
+          <a:p>
+            <a:r>
+              <a:rPr lang="en-US" dirty="0" smtClean="0"/>
+              <a:t>Answer: external decoders, a.k.a. set-top boxes</a:t>
+            </a:r>
+          </a:p>
+          <a:p>
+            <a:r>
+              <a:rPr lang="en-US" dirty="0" smtClean="0"/>
+              <a:t>Fights:</a:t>
+            </a:r>
+          </a:p>
+          <a:p>
+            <a:pPr lvl="1"/>
+            <a:r>
+              <a:rPr lang="en-US" dirty="0" smtClean="0"/>
+              <a:t>2010: fight over standards, but sanity prevailed in 2011 under Roy </a:t>
+            </a:r>
+            <a:r>
+              <a:rPr lang="en-US" dirty="0" err="1" smtClean="0"/>
+              <a:t>Padayachi</a:t>
+            </a:r>
+            <a:r>
+              <a:rPr lang="en-US" dirty="0" smtClean="0"/>
+              <a:t> who used the opportunity to adopt a newer version of the standard we were going to use anyway.</a:t>
+            </a:r>
+          </a:p>
+          <a:p>
+            <a:pPr lvl="1"/>
+            <a:r>
+              <a:rPr lang="en-US" dirty="0" smtClean="0"/>
+              <a:t>Since then: fight over “encryption” or “conditional access”, depending on who you speak to. Heading to </a:t>
+            </a:r>
+            <a:r>
+              <a:rPr lang="en-US" dirty="0" err="1" smtClean="0"/>
+              <a:t>ConCourt</a:t>
+            </a:r>
+            <a:r>
+              <a:rPr lang="en-US" dirty="0" smtClean="0"/>
+              <a:t>.</a:t>
+            </a:r>
+          </a:p>
+          <a:p>
+            <a:pPr lvl="1"/>
+            <a:r>
+              <a:rPr lang="en-US" dirty="0" smtClean="0"/>
+              <a:t>Think of conditional access like </a:t>
+            </a:r>
+            <a:r>
+              <a:rPr lang="en-US" dirty="0" err="1" smtClean="0"/>
+              <a:t>DStv</a:t>
+            </a:r>
+            <a:r>
+              <a:rPr lang="en-US" dirty="0" smtClean="0"/>
+              <a:t> being able to switch you off for not paying.</a:t>
+            </a:r>
+          </a:p>
+          <a:p>
+            <a:pPr lvl="1"/>
+            <a:r>
+              <a:rPr lang="en-US" dirty="0" smtClean="0"/>
+              <a:t>Hence dispute over “free-to-view” and “free-to-air”. </a:t>
+            </a:r>
+            <a:r>
+              <a:rPr lang="en-US" dirty="0" err="1" smtClean="0"/>
+              <a:t>E.tv</a:t>
+            </a:r>
+            <a:r>
+              <a:rPr lang="en-US" dirty="0" smtClean="0"/>
+              <a:t> want DTT to be free-to-view by default. </a:t>
+            </a:r>
+            <a:r>
+              <a:rPr lang="en-US" dirty="0" err="1" smtClean="0"/>
+              <a:t>DStv</a:t>
+            </a:r>
+            <a:r>
+              <a:rPr lang="en-US" dirty="0"/>
+              <a:t>,</a:t>
+            </a:r>
+            <a:r>
+              <a:rPr lang="en-US" dirty="0" smtClean="0"/>
+              <a:t> SABC, and gov’t want it to be free-to-air by default.</a:t>
+            </a:r>
+          </a:p>
+        </p:txBody>
+      </p:sp>
+    </p:spTree>
+    <p:extLst>
+      <p:ext uri="{BB962C8B-B14F-4D97-AF65-F5344CB8AC3E}">
+        <p14:creationId xmlns:p14="http://schemas.microsoft.com/office/powerpoint/2010/main" val="2373533476"/>
+      </p:ext>
+    </p:extLst>
+  </p:cSld>
+  <p:clrMapOvr>
+    <a:masterClrMapping/>
+  </p:clrMapOvr>
+</p:sld>
+</file>
+
+<file path=ppt/slides/slide13.xml><?xml version="1.0" encoding="utf-8"?>
 <p:sld xmlns:a="http://schemas.openxmlformats.org/drawingml/2006/main" xmlns:r="http://schemas.openxmlformats.org/officeDocument/2006/relationships" xmlns:p="http://schemas.openxmlformats.org/presentationml/2006/main">
   <p:cSld>
     <p:spTree>
@@ -3498,31 +3755,13 @@
           <a:p>
             <a:r>
               <a:rPr lang="en-US" dirty="0" smtClean="0"/>
-              <a:t>CRT</a:t>
-            </a:r>
-          </a:p>
-          <a:p>
-            <a:r>
-              <a:rPr lang="en-US" dirty="0" smtClean="0"/>
-              <a:t>Plasma</a:t>
-            </a:r>
-          </a:p>
-          <a:p>
-            <a:r>
-              <a:rPr lang="en-US" dirty="0" smtClean="0"/>
-              <a:t>LCD</a:t>
-            </a:r>
-          </a:p>
-          <a:p>
-            <a:r>
-              <a:rPr lang="en-US" dirty="0" smtClean="0"/>
-              <a:t>LED</a:t>
-            </a:r>
-          </a:p>
-          <a:p>
-            <a:r>
-              <a:rPr lang="en-US" dirty="0" smtClean="0"/>
-              <a:t>Bonus round: Smart/dumb, 3D, curved</a:t>
+              <a:t>CRT, Plasma, LCD, LED</a:t>
+            </a:r>
+          </a:p>
+          <a:p>
+            <a:r>
+              <a:rPr lang="en-US" dirty="0" smtClean="0"/>
+              <a:t>Smart/dumb, 3D, curved</a:t>
             </a:r>
           </a:p>
         </p:txBody>
@@ -3593,7 +3832,7 @@
         <p:spPr/>
         <p:txBody>
           <a:bodyPr>
-            <a:normAutofit fontScale="92500"/>
+            <a:normAutofit/>
           </a:bodyPr>
           <a:lstStyle/>
           <a:p>
@@ -3623,26 +3862,6 @@
             <a:r>
               <a:rPr lang="en-US" dirty="0" smtClean="0"/>
               <a:t>Wireless — terrestrial, satellite</a:t>
-            </a:r>
-          </a:p>
-          <a:p>
-            <a:r>
-              <a:rPr lang="en-US" dirty="0" smtClean="0"/>
-              <a:t>The big difference</a:t>
-            </a:r>
-          </a:p>
-          <a:p>
-            <a:pPr lvl="1"/>
-            <a:r>
-              <a:rPr lang="en-US" dirty="0" smtClean="0"/>
-              <a:t>Broadband: one sender, one receiver (most often)</a:t>
-            </a:r>
-          </a:p>
-          <a:p>
-            <a:pPr lvl="1"/>
-            <a:r>
-              <a:rPr lang="en-US" dirty="0" smtClean="0"/>
-              <a:t>Broadcast: one sender, many receivers</a:t>
             </a:r>
           </a:p>
           <a:p>
@@ -3703,12 +3922,18 @@
         </p:nvSpPr>
         <p:spPr/>
         <p:txBody>
-          <a:bodyPr/>
-          <a:lstStyle/>
-          <a:p>
-            <a:r>
-              <a:rPr lang="en-US" dirty="0" smtClean="0"/>
-              <a:t>Free vs. subscription TV</a:t>
+          <a:bodyPr>
+            <a:normAutofit/>
+          </a:bodyPr>
+          <a:lstStyle/>
+          <a:p>
+            <a:r>
+              <a:rPr lang="en-US" dirty="0"/>
+              <a:t>The big </a:t>
+            </a:r>
+            <a:r>
+              <a:rPr lang="en-US" dirty="0" smtClean="0"/>
+              <a:t>difference</a:t>
             </a:r>
             <a:endParaRPr lang="en-US" dirty="0"/>
           </a:p>
@@ -3731,84 +3956,28 @@
           <a:p>
             <a:r>
               <a:rPr lang="en-US" dirty="0" smtClean="0"/>
-              <a:t>Pay TV — </a:t>
-            </a:r>
-            <a:r>
-              <a:rPr lang="en-US" dirty="0" err="1" smtClean="0"/>
-              <a:t>DStv</a:t>
-            </a:r>
-            <a:r>
-              <a:rPr lang="en-US" dirty="0" smtClean="0"/>
-              <a:t>, </a:t>
-            </a:r>
-            <a:r>
-              <a:rPr lang="en-US" dirty="0" err="1" smtClean="0"/>
-              <a:t>GoTV</a:t>
-            </a:r>
-            <a:r>
-              <a:rPr lang="en-US" dirty="0" smtClean="0"/>
-              <a:t>, </a:t>
-            </a:r>
-            <a:r>
-              <a:rPr lang="en-US" dirty="0" err="1" smtClean="0"/>
-              <a:t>StarSat</a:t>
-            </a:r>
-            <a:endParaRPr lang="en-US" dirty="0" smtClean="0"/>
-          </a:p>
-          <a:p>
-            <a:r>
-              <a:rPr lang="en-US" dirty="0" smtClean="0"/>
-              <a:t>Free TV</a:t>
-            </a:r>
-          </a:p>
-          <a:p>
-            <a:pPr lvl="1"/>
-            <a:r>
-              <a:rPr lang="en-US" dirty="0" smtClean="0"/>
-              <a:t>Free-to-air: SABC, </a:t>
-            </a:r>
-            <a:r>
-              <a:rPr lang="en-US" dirty="0" err="1" smtClean="0"/>
-              <a:t>e.tv</a:t>
-            </a:r>
-            <a:endParaRPr lang="en-US" dirty="0" smtClean="0"/>
-          </a:p>
-          <a:p>
-            <a:pPr lvl="1"/>
-            <a:r>
-              <a:rPr lang="en-US" dirty="0" smtClean="0"/>
-              <a:t>Free-to-view: </a:t>
-            </a:r>
-            <a:r>
-              <a:rPr lang="en-US" dirty="0" err="1" smtClean="0"/>
-              <a:t>OpenView</a:t>
-            </a:r>
-            <a:r>
-              <a:rPr lang="en-US" dirty="0" smtClean="0"/>
-              <a:t> HD, </a:t>
-            </a:r>
-            <a:r>
-              <a:rPr lang="en-US" dirty="0" err="1" smtClean="0"/>
-              <a:t>Freevision</a:t>
-            </a:r>
-            <a:r>
-              <a:rPr lang="en-US" dirty="0" smtClean="0"/>
-              <a:t> (defunct)</a:t>
-            </a:r>
-          </a:p>
-          <a:p>
-            <a:pPr lvl="1"/>
-            <a:r>
-              <a:rPr lang="en-US" dirty="0" smtClean="0"/>
-              <a:t>In dispute: digital terrestrial TV (DTT — later)</a:t>
-            </a:r>
+              <a:t>Broadband</a:t>
+            </a:r>
+            <a:r>
+              <a:rPr lang="en-US" dirty="0"/>
+              <a:t>: one sender, one receiver (most often)</a:t>
+            </a:r>
+          </a:p>
+          <a:p>
+            <a:r>
+              <a:rPr lang="en-US" dirty="0"/>
+              <a:t>Broadcast: one sender, many receivers</a:t>
+            </a:r>
+          </a:p>
+          <a:p>
+            <a:endParaRPr lang="en-US" dirty="0"/>
           </a:p>
         </p:txBody>
       </p:sp>
     </p:spTree>
     <p:extLst>
       <p:ext uri="{BB962C8B-B14F-4D97-AF65-F5344CB8AC3E}">
-        <p14:creationId xmlns:p14="http://schemas.microsoft.com/office/powerpoint/2010/main" val="1139128984"/>
+        <p14:creationId xmlns:p14="http://schemas.microsoft.com/office/powerpoint/2010/main" val="892181082"/>
       </p:ext>
     </p:extLst>
   </p:cSld>
@@ -3852,7 +4021,7 @@
           <a:p>
             <a:r>
               <a:rPr lang="en-US" dirty="0" smtClean="0"/>
-              <a:t>Satellite broadcasting</a:t>
+              <a:t>Free vs. subscription TV</a:t>
             </a:r>
             <a:endParaRPr lang="en-US" dirty="0"/>
           </a:p>
@@ -3875,7 +4044,7 @@
           <a:p>
             <a:r>
               <a:rPr lang="en-US" dirty="0" smtClean="0"/>
-              <a:t>Pay TV — </a:t>
+              <a:t>Pay TV — e.g. </a:t>
             </a:r>
             <a:r>
               <a:rPr lang="en-US" dirty="0" err="1" smtClean="0"/>
@@ -3887,6 +4056,14 @@
             </a:r>
             <a:r>
               <a:rPr lang="en-US" dirty="0" err="1" smtClean="0"/>
+              <a:t>GoTV</a:t>
+            </a:r>
+            <a:r>
+              <a:rPr lang="en-US" dirty="0" smtClean="0"/>
+              <a:t>, </a:t>
+            </a:r>
+            <a:r>
+              <a:rPr lang="en-US" dirty="0" err="1" smtClean="0"/>
               <a:t>StarSat</a:t>
             </a:r>
             <a:endParaRPr lang="en-US" dirty="0" smtClean="0"/>
@@ -3894,41 +4071,7 @@
           <a:p>
             <a:r>
               <a:rPr lang="en-US" dirty="0" smtClean="0"/>
-              <a:t>Free-to-view: </a:t>
-            </a:r>
-            <a:r>
-              <a:rPr lang="en-US" dirty="0" err="1" smtClean="0"/>
-              <a:t>OpenView</a:t>
-            </a:r>
-            <a:r>
-              <a:rPr lang="en-US" dirty="0" smtClean="0"/>
-              <a:t> HD</a:t>
-            </a:r>
-          </a:p>
-          <a:p>
-            <a:r>
-              <a:rPr lang="en-US" dirty="0" smtClean="0"/>
-              <a:t>What does </a:t>
-            </a:r>
-            <a:r>
-              <a:rPr lang="en-US" dirty="0" err="1" smtClean="0"/>
-              <a:t>DStv</a:t>
-            </a:r>
-            <a:r>
-              <a:rPr lang="en-US" dirty="0" smtClean="0"/>
-              <a:t> stand for?</a:t>
-            </a:r>
-          </a:p>
-          <a:p>
-            <a:r>
-              <a:rPr lang="en-US" dirty="0" smtClean="0"/>
-              <a:t>Why is “digital” in the name?</a:t>
-            </a:r>
-          </a:p>
-          <a:p>
-            <a:r>
-              <a:rPr lang="en-US" dirty="0" smtClean="0"/>
-              <a:t>Analogue satellite is dead, so we’re ignoring it.</a:t>
+              <a:t>Free TV — Free-to-air and Free-to-view</a:t>
             </a:r>
           </a:p>
         </p:txBody>
@@ -3936,7 +4079,7 @@
     </p:spTree>
     <p:extLst>
       <p:ext uri="{BB962C8B-B14F-4D97-AF65-F5344CB8AC3E}">
-        <p14:creationId xmlns:p14="http://schemas.microsoft.com/office/powerpoint/2010/main" val="3477214772"/>
+        <p14:creationId xmlns:p14="http://schemas.microsoft.com/office/powerpoint/2010/main" val="1139128984"/>
       </p:ext>
     </p:extLst>
   </p:cSld>
@@ -3980,7 +4123,30 @@
           <a:p>
             <a:r>
               <a:rPr lang="en-US" dirty="0" smtClean="0"/>
-              <a:t>How </a:t>
+              <a:t>Satellite broadcasting</a:t>
+            </a:r>
+            <a:endParaRPr lang="en-US" dirty="0"/>
+          </a:p>
+        </p:txBody>
+      </p:sp>
+      <p:sp>
+        <p:nvSpPr>
+          <p:cNvPr id="3" name="Content Placeholder 2"/>
+          <p:cNvSpPr>
+            <a:spLocks noGrp="1"/>
+          </p:cNvSpPr>
+          <p:nvPr>
+            <p:ph idx="1"/>
+          </p:nvPr>
+        </p:nvSpPr>
+        <p:spPr/>
+        <p:txBody>
+          <a:bodyPr/>
+          <a:lstStyle/>
+          <a:p>
+            <a:r>
+              <a:rPr lang="en-US" dirty="0" smtClean="0"/>
+              <a:t>Pay TV — </a:t>
             </a:r>
             <a:r>
               <a:rPr lang="en-US" dirty="0" err="1" smtClean="0"/>
@@ -3988,152 +4154,30 @@
             </a:r>
             <a:r>
               <a:rPr lang="en-US" dirty="0" smtClean="0"/>
-              <a:t> works</a:t>
-            </a:r>
-            <a:endParaRPr lang="en-US" dirty="0"/>
-          </a:p>
-        </p:txBody>
-      </p:sp>
-      <p:sp>
-        <p:nvSpPr>
-          <p:cNvPr id="3" name="Content Placeholder 2"/>
-          <p:cNvSpPr>
-            <a:spLocks noGrp="1"/>
-          </p:cNvSpPr>
-          <p:nvPr>
-            <p:ph idx="1"/>
-          </p:nvPr>
-        </p:nvSpPr>
-        <p:spPr/>
-        <p:txBody>
-          <a:bodyPr>
-            <a:normAutofit fontScale="70000" lnSpcReduction="20000"/>
-          </a:bodyPr>
-          <a:lstStyle/>
-          <a:p>
-            <a:r>
-              <a:rPr lang="en-US" dirty="0" smtClean="0"/>
-              <a:t>Installation: dish, cables, decoder</a:t>
-            </a:r>
-          </a:p>
-          <a:p>
-            <a:r>
-              <a:rPr lang="en-US" dirty="0" smtClean="0"/>
-              <a:t>Signal beamed across continent over satellite in orbit over the earth — Intelsat 20</a:t>
-            </a:r>
-          </a:p>
-          <a:p>
-            <a:r>
-              <a:rPr lang="en-US" dirty="0" smtClean="0"/>
-              <a:t>Backup satellite online in 2016: Intelsat 36</a:t>
-            </a:r>
-          </a:p>
-          <a:p>
-            <a:r>
-              <a:rPr lang="en-US" dirty="0" smtClean="0"/>
-              <a:t>But how does </a:t>
+              <a:t>, </a:t>
             </a:r>
             <a:r>
               <a:rPr lang="en-US" dirty="0" err="1" smtClean="0"/>
-              <a:t>DStv</a:t>
-            </a:r>
-            <a:r>
-              <a:rPr lang="en-US" dirty="0" smtClean="0"/>
-              <a:t> get all its channels?</a:t>
-            </a:r>
-          </a:p>
-          <a:p>
-            <a:pPr lvl="1"/>
-            <a:r>
-              <a:rPr lang="en-US" dirty="0" smtClean="0"/>
-              <a:t>Everything controlled from </a:t>
+              <a:t>StarSat</a:t>
+            </a:r>
+            <a:endParaRPr lang="en-US" dirty="0" smtClean="0"/>
+          </a:p>
+          <a:p>
+            <a:r>
+              <a:rPr lang="en-US" dirty="0" smtClean="0"/>
+              <a:t>Free-to-</a:t>
+            </a:r>
+            <a:r>
+              <a:rPr lang="en-US" dirty="0" smtClean="0"/>
+              <a:t>view — </a:t>
             </a:r>
             <a:r>
               <a:rPr lang="en-US" dirty="0" err="1" smtClean="0"/>
-              <a:t>Randburg</a:t>
-            </a:r>
-            <a:r>
-              <a:rPr lang="en-US" dirty="0" smtClean="0"/>
-              <a:t>, but how does it get there?</a:t>
-            </a:r>
-          </a:p>
-          <a:p>
-            <a:pPr lvl="1"/>
-            <a:r>
-              <a:rPr lang="en-US" dirty="0" smtClean="0"/>
-              <a:t>Own channels, beamed up right from </a:t>
-            </a:r>
-            <a:r>
-              <a:rPr lang="en-US" dirty="0" err="1" smtClean="0"/>
-              <a:t>Randburg</a:t>
-            </a:r>
-            <a:r>
-              <a:rPr lang="en-US" dirty="0" smtClean="0"/>
-              <a:t>, e.g. M-Net, </a:t>
-            </a:r>
-            <a:r>
-              <a:rPr lang="en-US" dirty="0" err="1" smtClean="0"/>
-              <a:t>SuperSport</a:t>
-            </a:r>
-            <a:r>
-              <a:rPr lang="en-US" dirty="0" smtClean="0"/>
-              <a:t>.</a:t>
-            </a:r>
-          </a:p>
-          <a:p>
-            <a:pPr lvl="1"/>
-            <a:r>
-              <a:rPr lang="en-US" dirty="0" smtClean="0"/>
-              <a:t>Discovery, BBC, etc. uplink from wherever they are, either over </a:t>
-            </a:r>
-            <a:r>
-              <a:rPr lang="en-US" dirty="0" err="1" smtClean="0"/>
-              <a:t>fibre</a:t>
-            </a:r>
-            <a:r>
-              <a:rPr lang="en-US" dirty="0" smtClean="0"/>
-              <a:t> or satellite.</a:t>
-            </a:r>
-          </a:p>
-          <a:p>
-            <a:pPr lvl="1"/>
-            <a:r>
-              <a:rPr lang="en-US" dirty="0" err="1" smtClean="0"/>
-              <a:t>MultiChoice</a:t>
-            </a:r>
-            <a:r>
-              <a:rPr lang="en-US" dirty="0" smtClean="0"/>
-              <a:t> brings the third-party channel to a hub (e.g. </a:t>
-            </a:r>
-            <a:r>
-              <a:rPr lang="en-US" dirty="0" err="1" smtClean="0"/>
-              <a:t>Randburg</a:t>
-            </a:r>
-            <a:r>
-              <a:rPr lang="en-US" dirty="0" smtClean="0"/>
-              <a:t>), where it fixes audio, inserts ads, does conditional access.</a:t>
-            </a:r>
-          </a:p>
-          <a:p>
-            <a:pPr lvl="1"/>
-            <a:r>
-              <a:rPr lang="en-US" dirty="0" smtClean="0"/>
-              <a:t>The channel is then uplinked to IS-20.</a:t>
-            </a:r>
-          </a:p>
-          <a:p>
-            <a:pPr lvl="1"/>
-            <a:r>
-              <a:rPr lang="en-US" dirty="0" smtClean="0"/>
-              <a:t>When a channel goes dead, it’s not always the </a:t>
-            </a:r>
-            <a:r>
-              <a:rPr lang="en-US" dirty="0" err="1" smtClean="0"/>
-              <a:t>pay-TV</a:t>
-            </a:r>
-            <a:r>
-              <a:rPr lang="en-US" dirty="0" smtClean="0"/>
-              <a:t> operator’s fault, but they take ultimate responsibility.</a:t>
+              <a:t>OpenView</a:t>
+            </a:r>
+            <a:r>
+              <a:rPr lang="en-US" dirty="0" smtClean="0"/>
+              <a:t> HD</a:t>
             </a:r>
           </a:p>
         </p:txBody>
@@ -4141,7 +4185,7 @@
     </p:spTree>
     <p:extLst>
       <p:ext uri="{BB962C8B-B14F-4D97-AF65-F5344CB8AC3E}">
-        <p14:creationId xmlns:p14="http://schemas.microsoft.com/office/powerpoint/2010/main" val="876271735"/>
+        <p14:creationId xmlns:p14="http://schemas.microsoft.com/office/powerpoint/2010/main" val="3477214772"/>
       </p:ext>
     </p:extLst>
   </p:cSld>
@@ -4180,62 +4224,59 @@
         </p:nvSpPr>
         <p:spPr/>
         <p:txBody>
+          <a:bodyPr/>
+          <a:lstStyle/>
+          <a:p>
+            <a:r>
+              <a:rPr lang="en-US" dirty="0" smtClean="0"/>
+              <a:t>How </a:t>
+            </a:r>
+            <a:r>
+              <a:rPr lang="en-US" dirty="0" err="1" smtClean="0"/>
+              <a:t>DStv</a:t>
+            </a:r>
+            <a:r>
+              <a:rPr lang="en-US" dirty="0" smtClean="0"/>
+              <a:t> works</a:t>
+            </a:r>
+            <a:endParaRPr lang="en-US" dirty="0"/>
+          </a:p>
+        </p:txBody>
+      </p:sp>
+      <p:sp>
+        <p:nvSpPr>
+          <p:cNvPr id="3" name="Content Placeholder 2"/>
+          <p:cNvSpPr>
+            <a:spLocks noGrp="1"/>
+          </p:cNvSpPr>
+          <p:nvPr>
+            <p:ph idx="1"/>
+          </p:nvPr>
+        </p:nvSpPr>
+        <p:spPr/>
+        <p:txBody>
           <a:bodyPr>
-            <a:normAutofit fontScale="90000"/>
+            <a:normAutofit/>
           </a:bodyPr>
           <a:lstStyle/>
           <a:p>
             <a:r>
               <a:rPr lang="en-US" dirty="0" smtClean="0"/>
-              <a:t>Broadcasters have wholesalers too</a:t>
-            </a:r>
-            <a:r>
-              <a:rPr lang="mr-IN" dirty="0" smtClean="0"/>
-              <a:t>…</a:t>
-            </a:r>
-            <a:endParaRPr lang="en-US" dirty="0"/>
-          </a:p>
-        </p:txBody>
-      </p:sp>
-      <p:sp>
-        <p:nvSpPr>
-          <p:cNvPr id="3" name="Content Placeholder 2"/>
-          <p:cNvSpPr>
-            <a:spLocks noGrp="1"/>
-          </p:cNvSpPr>
-          <p:nvPr>
-            <p:ph idx="1"/>
-          </p:nvPr>
-        </p:nvSpPr>
-        <p:spPr/>
-        <p:txBody>
-          <a:bodyPr/>
-          <a:lstStyle/>
-          <a:p>
-            <a:r>
-              <a:rPr lang="en-US" dirty="0" err="1" smtClean="0"/>
-              <a:t>GlobeCast</a:t>
-            </a:r>
-            <a:r>
-              <a:rPr lang="en-US" dirty="0" smtClean="0"/>
-              <a:t>: Oscar </a:t>
-            </a:r>
-            <a:r>
-              <a:rPr lang="en-US" dirty="0" err="1" smtClean="0"/>
-              <a:t>Pistorius</a:t>
-            </a:r>
-            <a:r>
-              <a:rPr lang="en-US" dirty="0" smtClean="0"/>
-              <a:t> trial</a:t>
-            </a:r>
-            <a:endParaRPr lang="en-US" dirty="0"/>
+              <a:t>Installation: dish, cables, decoder</a:t>
+            </a:r>
+          </a:p>
+          <a:p>
+            <a:r>
+              <a:rPr lang="en-US" dirty="0" smtClean="0"/>
+              <a:t>Signal beamed across continent using satellites in orbit over the earth — Intelsat 20 and Intelsat 36</a:t>
+            </a:r>
           </a:p>
         </p:txBody>
       </p:sp>
     </p:spTree>
     <p:extLst>
       <p:ext uri="{BB962C8B-B14F-4D97-AF65-F5344CB8AC3E}">
-        <p14:creationId xmlns:p14="http://schemas.microsoft.com/office/powerpoint/2010/main" val="2972805563"/>
+        <p14:creationId xmlns:p14="http://schemas.microsoft.com/office/powerpoint/2010/main" val="876271735"/>
       </p:ext>
     </p:extLst>
   </p:cSld>
@@ -4279,7 +4320,23 @@
           <a:p>
             <a:r>
               <a:rPr lang="en-US" dirty="0" smtClean="0"/>
-              <a:t>Terrestrial broadcasting</a:t>
+              <a:t>How </a:t>
+            </a:r>
+            <a:r>
+              <a:rPr lang="en-US" dirty="0"/>
+              <a:t>does </a:t>
+            </a:r>
+            <a:r>
+              <a:rPr lang="en-US" dirty="0" err="1"/>
+              <a:t>DStv</a:t>
+            </a:r>
+            <a:r>
+              <a:rPr lang="en-US" dirty="0"/>
+              <a:t> get all its </a:t>
+            </a:r>
+            <a:r>
+              <a:rPr lang="en-US" dirty="0" smtClean="0"/>
+              <a:t>channels?</a:t>
             </a:r>
             <a:endParaRPr lang="en-US" dirty="0"/>
           </a:p>
@@ -4302,59 +4359,66 @@
           </a:bodyPr>
           <a:lstStyle/>
           <a:p>
-            <a:r>
-              <a:rPr lang="en-US" dirty="0" smtClean="0"/>
-              <a:t>Remember bunny ears, or plugging a roof antenna into your TV? Lots of people actually still use that.</a:t>
-            </a:r>
-          </a:p>
-          <a:p>
-            <a:r>
-              <a:rPr lang="en-US" dirty="0" smtClean="0"/>
-              <a:t>Terrestrial = radio and TV over an antenna</a:t>
-            </a:r>
-          </a:p>
-          <a:p>
-            <a:r>
-              <a:rPr lang="en-US" dirty="0" smtClean="0"/>
-              <a:t>SABC, </a:t>
-            </a:r>
+            <a:pPr lvl="1"/>
+            <a:r>
+              <a:rPr lang="en-US" dirty="0" smtClean="0"/>
+              <a:t>Own </a:t>
+            </a:r>
+            <a:r>
+              <a:rPr lang="en-US" dirty="0"/>
+              <a:t>channels, beamed up right from </a:t>
+            </a:r>
+            <a:r>
+              <a:rPr lang="en-US" dirty="0" err="1"/>
+              <a:t>Randburg</a:t>
+            </a:r>
+            <a:r>
+              <a:rPr lang="en-US" dirty="0"/>
+              <a:t>, e.g. M-Net, </a:t>
+            </a:r>
+            <a:r>
+              <a:rPr lang="en-US" dirty="0" err="1"/>
+              <a:t>SuperSport</a:t>
+            </a:r>
+            <a:r>
+              <a:rPr lang="en-US" dirty="0"/>
+              <a:t>.</a:t>
+            </a:r>
+          </a:p>
+          <a:p>
+            <a:pPr lvl="1"/>
             <a:r>
               <a:rPr lang="en-US" dirty="0" err="1" smtClean="0"/>
-              <a:t>e.tv</a:t>
-            </a:r>
-            <a:r>
-              <a:rPr lang="en-US" dirty="0" smtClean="0"/>
-              <a:t>, radio, </a:t>
-            </a:r>
-            <a:r>
-              <a:rPr lang="en-US" dirty="0" err="1" smtClean="0"/>
-              <a:t>GOtv</a:t>
-            </a:r>
-            <a:r>
-              <a:rPr lang="en-US" dirty="0" smtClean="0"/>
-              <a:t> (DTT only)</a:t>
-            </a:r>
-          </a:p>
-          <a:p>
-            <a:r>
-              <a:rPr lang="en-US" dirty="0" smtClean="0"/>
-              <a:t>Community stations</a:t>
-            </a:r>
-          </a:p>
-          <a:p>
-            <a:pPr lvl="1"/>
-            <a:endParaRPr lang="en-US" dirty="0" smtClean="0"/>
-          </a:p>
-          <a:p>
-            <a:pPr lvl="1"/>
-            <a:endParaRPr lang="en-US" dirty="0" smtClean="0"/>
+              <a:t>MultiChoice</a:t>
+            </a:r>
+            <a:r>
+              <a:rPr lang="en-US" dirty="0" smtClean="0"/>
+              <a:t> </a:t>
+            </a:r>
+            <a:r>
+              <a:rPr lang="en-US" dirty="0"/>
+              <a:t>brings the third-party channel to a hub (e.g. </a:t>
+            </a:r>
+            <a:r>
+              <a:rPr lang="en-US" dirty="0" err="1"/>
+              <a:t>Randburg</a:t>
+            </a:r>
+            <a:r>
+              <a:rPr lang="en-US" dirty="0"/>
+              <a:t>), where it fixes audio, inserts ads, does conditional access</a:t>
+            </a:r>
+            <a:r>
+              <a:rPr lang="en-US" dirty="0" smtClean="0"/>
+              <a:t>.</a:t>
+            </a:r>
+            <a:endParaRPr lang="en-US" dirty="0"/>
           </a:p>
         </p:txBody>
       </p:sp>
     </p:spTree>
     <p:extLst>
       <p:ext uri="{BB962C8B-B14F-4D97-AF65-F5344CB8AC3E}">
-        <p14:creationId xmlns:p14="http://schemas.microsoft.com/office/powerpoint/2010/main" val="1780438792"/>
+        <p14:creationId xmlns:p14="http://schemas.microsoft.com/office/powerpoint/2010/main" val="3098515590"/>
       </p:ext>
     </p:extLst>
   </p:cSld>
@@ -4398,7 +4462,7 @@
           <a:p>
             <a:r>
               <a:rPr lang="en-US" dirty="0" smtClean="0"/>
-              <a:t>Digital migration</a:t>
+              <a:t>Terrestrial broadcasting</a:t>
             </a:r>
             <a:endParaRPr lang="en-US" dirty="0"/>
           </a:p>
@@ -4417,117 +4481,44 @@
         <p:spPr/>
         <p:txBody>
           <a:bodyPr>
-            <a:normAutofit fontScale="62500" lnSpcReduction="20000"/>
+            <a:normAutofit/>
           </a:bodyPr>
           <a:lstStyle/>
           <a:p>
             <a:r>
               <a:rPr lang="en-US" dirty="0" smtClean="0"/>
-              <a:t>Terrestrial TV uses old “analogue standard”.</a:t>
-            </a:r>
-          </a:p>
-          <a:p>
-            <a:r>
-              <a:rPr lang="en-US" dirty="0" smtClean="0"/>
-              <a:t>Want to switch to better “digital” standard, and turn analogue off.</a:t>
-            </a:r>
-          </a:p>
-          <a:p>
-            <a:r>
-              <a:rPr lang="en-US" dirty="0" smtClean="0"/>
-              <a:t>However, TVs in SA all currently can only receive the analogue signal — integrated/embedded tuners. Think of it like a built-in decoder. So now what?</a:t>
-            </a:r>
-          </a:p>
-          <a:p>
-            <a:r>
-              <a:rPr lang="en-US" dirty="0" smtClean="0"/>
-              <a:t>Answer: external decoders, a.k.a. set-top boxes</a:t>
-            </a:r>
-          </a:p>
-          <a:p>
-            <a:r>
-              <a:rPr lang="en-US" dirty="0" smtClean="0"/>
-              <a:t>Fights:</a:t>
-            </a:r>
-          </a:p>
-          <a:p>
-            <a:pPr lvl="1"/>
-            <a:r>
-              <a:rPr lang="en-US" dirty="0" smtClean="0"/>
-              <a:t>2010: fight over standards, but sanity prevailed in 2011 under Roy </a:t>
-            </a:r>
-            <a:r>
-              <a:rPr lang="en-US" dirty="0" err="1" smtClean="0"/>
-              <a:t>Padayachi</a:t>
-            </a:r>
-            <a:r>
-              <a:rPr lang="en-US" dirty="0" smtClean="0"/>
-              <a:t> who used the opportunity to adopt a newer version of the standard we were going to use anyway.</a:t>
-            </a:r>
-          </a:p>
-          <a:p>
-            <a:pPr lvl="1"/>
-            <a:r>
-              <a:rPr lang="en-US" dirty="0" smtClean="0"/>
-              <a:t>Since then: fight over “encryption” or “conditional access”, depending on who you speak to. Heading to </a:t>
+              <a:t>Remember bunny ears, or plugging a roof antenna into your TV? Lots of people actually still use that.</a:t>
+            </a:r>
+          </a:p>
+          <a:p>
+            <a:r>
+              <a:rPr lang="en-US" dirty="0" smtClean="0"/>
+              <a:t>Migrating from old “analogue” to “digital” standard, but it’s stuck pending </a:t>
             </a:r>
             <a:r>
               <a:rPr lang="en-US" dirty="0" err="1" smtClean="0"/>
               <a:t>ConCourt</a:t>
             </a:r>
             <a:r>
-              <a:rPr lang="en-US" dirty="0" smtClean="0"/>
-              <a:t>.</a:t>
-            </a:r>
+              <a:rPr lang="en-US" smtClean="0"/>
+              <a:t> case.</a:t>
+            </a:r>
+            <a:endParaRPr lang="en-US" dirty="0" smtClean="0"/>
           </a:p>
           <a:p>
             <a:pPr lvl="1"/>
-            <a:r>
-              <a:rPr lang="en-US" dirty="0" smtClean="0"/>
-              <a:t>Think of conditional access like </a:t>
-            </a:r>
-            <a:r>
-              <a:rPr lang="en-US" dirty="0" err="1" smtClean="0"/>
-              <a:t>DStv</a:t>
-            </a:r>
-            <a:r>
-              <a:rPr lang="en-US" dirty="0" smtClean="0"/>
-              <a:t> being able to switch you off for not paying.</a:t>
-            </a:r>
+            <a:endParaRPr lang="en-US" dirty="0" smtClean="0"/>
           </a:p>
           <a:p>
             <a:pPr lvl="1"/>
-            <a:r>
-              <a:rPr lang="en-US" dirty="0" smtClean="0"/>
-              <a:t>Hence dispute over “free-to-view” and “free-to-air”. </a:t>
-            </a:r>
-            <a:r>
-              <a:rPr lang="en-US" dirty="0" err="1" smtClean="0"/>
-              <a:t>E.tv</a:t>
-            </a:r>
-            <a:r>
-              <a:rPr lang="en-US" dirty="0" smtClean="0"/>
-              <a:t> want DTT to be free-to-view by default. </a:t>
-            </a:r>
-            <a:r>
-              <a:rPr lang="en-US" dirty="0" err="1" smtClean="0"/>
-              <a:t>DStv</a:t>
-            </a:r>
-            <a:r>
-              <a:rPr lang="en-US" dirty="0"/>
-              <a:t>,</a:t>
-            </a:r>
-            <a:r>
-              <a:rPr lang="en-US" dirty="0" smtClean="0"/>
-              <a:t> SABC, and gov’t want it to be free-to-air by default.</a:t>
-            </a:r>
+            <a:endParaRPr lang="en-US" dirty="0" smtClean="0"/>
           </a:p>
         </p:txBody>
       </p:sp>
     </p:spTree>
     <p:extLst>
       <p:ext uri="{BB962C8B-B14F-4D97-AF65-F5344CB8AC3E}">
-        <p14:creationId xmlns:p14="http://schemas.microsoft.com/office/powerpoint/2010/main" val="2373533476"/>
+        <p14:creationId xmlns:p14="http://schemas.microsoft.com/office/powerpoint/2010/main" val="1780438792"/>
       </p:ext>
     </p:extLst>
   </p:cSld>

</xml_diff>